<commit_message>
separate aws and azure code bases
</commit_message>
<xml_diff>
--- a/Presentation2.pptx
+++ b/Presentation2.pptx
@@ -104,7 +104,121 @@
       </a:defRPr>
     </a:lvl9pPr>
   </p:defaultTextStyle>
+  <p:extLst>
+    <p:ext uri="{EFAFB233-063F-42B5-8137-9DF3F51BA10A}">
+      <p15:sldGuideLst xmlns:p15="http://schemas.microsoft.com/office/powerpoint/2012/main"/>
+    </p:ext>
+  </p:extLst>
 </p:presentation>
+</file>
+
+<file path=ppt/revisionInfo.xml><?xml version="1.0" encoding="utf-8"?>
+<p1510:revInfo xmlns:a="http://schemas.openxmlformats.org/drawingml/2006/main" xmlns:r="http://schemas.openxmlformats.org/officeDocument/2006/relationships" xmlns:p1510="http://schemas.microsoft.com/office/powerpoint/2015/10/main">
+  <p1510:revLst>
+    <p1510:client id="{9BBA9E24-1FE7-0D47-804C-6BAA32BA66B0}" v="5" dt="2020-07-11T17:18:14.980"/>
+  </p1510:revLst>
+</p1510:revInfo>
+</file>
+
+<file path=ppt/changesInfos/changesInfo1.xml><?xml version="1.0" encoding="utf-8"?>
+<pc:chgInfo xmlns:a="http://schemas.openxmlformats.org/drawingml/2006/main" xmlns:r="http://schemas.openxmlformats.org/officeDocument/2006/relationships" xmlns:ac="http://schemas.microsoft.com/office/drawing/2013/main/command" xmlns:pc="http://schemas.microsoft.com/office/powerpoint/2013/main/command">
+  <pc:docChgLst>
+    <pc:chgData name="Christopher M Anderson" userId="9d5a769f-d16b-4a6a-ab56-192655bf8f9f" providerId="ADAL" clId="{9BBA9E24-1FE7-0D47-804C-6BAA32BA66B0}"/>
+    <pc:docChg chg="undo custSel modSld">
+      <pc:chgData name="Christopher M Anderson" userId="9d5a769f-d16b-4a6a-ab56-192655bf8f9f" providerId="ADAL" clId="{9BBA9E24-1FE7-0D47-804C-6BAA32BA66B0}" dt="2020-07-11T17:18:24.645" v="33" actId="14100"/>
+      <pc:docMkLst>
+        <pc:docMk/>
+      </pc:docMkLst>
+      <pc:sldChg chg="addSp delSp modSp">
+        <pc:chgData name="Christopher M Anderson" userId="9d5a769f-d16b-4a6a-ab56-192655bf8f9f" providerId="ADAL" clId="{9BBA9E24-1FE7-0D47-804C-6BAA32BA66B0}" dt="2020-07-11T17:18:24.645" v="33" actId="14100"/>
+        <pc:sldMkLst>
+          <pc:docMk/>
+          <pc:sldMk cId="4199216807" sldId="256"/>
+        </pc:sldMkLst>
+        <pc:spChg chg="mod">
+          <ac:chgData name="Christopher M Anderson" userId="9d5a769f-d16b-4a6a-ab56-192655bf8f9f" providerId="ADAL" clId="{9BBA9E24-1FE7-0D47-804C-6BAA32BA66B0}" dt="2020-07-11T17:15:45.720" v="13" actId="14100"/>
+          <ac:spMkLst>
+            <pc:docMk/>
+            <pc:sldMk cId="4199216807" sldId="256"/>
+            <ac:spMk id="24" creationId="{DDC95E21-0C5E-7F49-A877-D6EDA521FA3B}"/>
+          </ac:spMkLst>
+        </pc:spChg>
+        <pc:spChg chg="mod">
+          <ac:chgData name="Christopher M Anderson" userId="9d5a769f-d16b-4a6a-ab56-192655bf8f9f" providerId="ADAL" clId="{9BBA9E24-1FE7-0D47-804C-6BAA32BA66B0}" dt="2020-07-11T17:17:55.818" v="25" actId="1076"/>
+          <ac:spMkLst>
+            <pc:docMk/>
+            <pc:sldMk cId="4199216807" sldId="256"/>
+            <ac:spMk id="86" creationId="{64D38A2E-8362-AE47-BDF5-3A489331C391}"/>
+          </ac:spMkLst>
+        </pc:spChg>
+        <pc:spChg chg="mod">
+          <ac:chgData name="Christopher M Anderson" userId="9d5a769f-d16b-4a6a-ab56-192655bf8f9f" providerId="ADAL" clId="{9BBA9E24-1FE7-0D47-804C-6BAA32BA66B0}" dt="2020-07-11T17:17:35.133" v="20" actId="1076"/>
+          <ac:spMkLst>
+            <pc:docMk/>
+            <pc:sldMk cId="4199216807" sldId="256"/>
+            <ac:spMk id="87" creationId="{8446BD38-BF58-F54F-BA34-12EC78D5C344}"/>
+          </ac:spMkLst>
+        </pc:spChg>
+        <pc:picChg chg="add mod">
+          <ac:chgData name="Christopher M Anderson" userId="9d5a769f-d16b-4a6a-ab56-192655bf8f9f" providerId="ADAL" clId="{9BBA9E24-1FE7-0D47-804C-6BAA32BA66B0}" dt="2020-07-11T17:15:53.731" v="15" actId="1076"/>
+          <ac:picMkLst>
+            <pc:docMk/>
+            <pc:sldMk cId="4199216807" sldId="256"/>
+            <ac:picMk id="2" creationId="{663B3FC0-7A3E-BF4A-9708-907904A539CF}"/>
+          </ac:picMkLst>
+        </pc:picChg>
+        <pc:picChg chg="mod">
+          <ac:chgData name="Christopher M Anderson" userId="9d5a769f-d16b-4a6a-ab56-192655bf8f9f" providerId="ADAL" clId="{9BBA9E24-1FE7-0D47-804C-6BAA32BA66B0}" dt="2020-07-11T17:15:48.310" v="14" actId="1076"/>
+          <ac:picMkLst>
+            <pc:docMk/>
+            <pc:sldMk cId="4199216807" sldId="256"/>
+            <ac:picMk id="18" creationId="{BC31A026-439A-6F45-9BBE-6C6AC8A4E72F}"/>
+          </ac:picMkLst>
+        </pc:picChg>
+        <pc:picChg chg="add mod">
+          <ac:chgData name="Christopher M Anderson" userId="9d5a769f-d16b-4a6a-ab56-192655bf8f9f" providerId="ADAL" clId="{9BBA9E24-1FE7-0D47-804C-6BAA32BA66B0}" dt="2020-07-11T17:17:44.844" v="22" actId="1076"/>
+          <ac:picMkLst>
+            <pc:docMk/>
+            <pc:sldMk cId="4199216807" sldId="256"/>
+            <ac:picMk id="47" creationId="{1336D0F7-3708-0C44-995F-0E1777AF5FD2}"/>
+          </ac:picMkLst>
+        </pc:picChg>
+        <pc:cxnChg chg="add del mod">
+          <ac:chgData name="Christopher M Anderson" userId="9d5a769f-d16b-4a6a-ab56-192655bf8f9f" providerId="ADAL" clId="{9BBA9E24-1FE7-0D47-804C-6BAA32BA66B0}" dt="2020-07-11T17:15:25.179" v="10" actId="21"/>
+          <ac:cxnSpMkLst>
+            <pc:docMk/>
+            <pc:sldMk cId="4199216807" sldId="256"/>
+            <ac:cxnSpMk id="12" creationId="{8F7DF1F9-7AA6-8D42-9A43-E86EC9BD4CDD}"/>
+          </ac:cxnSpMkLst>
+        </pc:cxnChg>
+        <pc:cxnChg chg="add">
+          <ac:chgData name="Christopher M Anderson" userId="9d5a769f-d16b-4a6a-ab56-192655bf8f9f" providerId="ADAL" clId="{9BBA9E24-1FE7-0D47-804C-6BAA32BA66B0}" dt="2020-07-11T17:16:11.486" v="16" actId="11529"/>
+          <ac:cxnSpMkLst>
+            <pc:docMk/>
+            <pc:sldMk cId="4199216807" sldId="256"/>
+            <ac:cxnSpMk id="16" creationId="{1EE3FB60-8A67-7D45-B6F0-43CED089F08D}"/>
+          </ac:cxnSpMkLst>
+        </pc:cxnChg>
+        <pc:cxnChg chg="add mod">
+          <ac:chgData name="Christopher M Anderson" userId="9d5a769f-d16b-4a6a-ab56-192655bf8f9f" providerId="ADAL" clId="{9BBA9E24-1FE7-0D47-804C-6BAA32BA66B0}" dt="2020-07-11T17:18:11.355" v="29" actId="14100"/>
+          <ac:cxnSpMkLst>
+            <pc:docMk/>
+            <pc:sldMk cId="4199216807" sldId="256"/>
+            <ac:cxnSpMk id="48" creationId="{F1F40F82-2CA5-674D-89E9-233BEE209896}"/>
+          </ac:cxnSpMkLst>
+        </pc:cxnChg>
+        <pc:cxnChg chg="add mod">
+          <ac:chgData name="Christopher M Anderson" userId="9d5a769f-d16b-4a6a-ab56-192655bf8f9f" providerId="ADAL" clId="{9BBA9E24-1FE7-0D47-804C-6BAA32BA66B0}" dt="2020-07-11T17:18:24.645" v="33" actId="14100"/>
+          <ac:cxnSpMkLst>
+            <pc:docMk/>
+            <pc:sldMk cId="4199216807" sldId="256"/>
+            <ac:cxnSpMk id="52" creationId="{289D9AE1-D10C-5443-8433-3D6DAC3257B1}"/>
+          </ac:cxnSpMkLst>
+        </pc:cxnChg>
+      </pc:sldChg>
+    </pc:docChg>
+  </pc:docChgLst>
+</pc:chgInfo>
 </file>
 
 <file path=ppt/slideLayouts/slideLayout1.xml><?xml version="1.0" encoding="utf-8"?>
@@ -254,7 +368,7 @@
           <a:p>
             <a:fld id="{AE55CC3F-D754-3648-A1F8-EFCD929FF2CD}" type="datetimeFigureOut">
               <a:rPr lang="en-US" smtClean="0"/>
-              <a:t>7/4/20</a:t>
+              <a:t>7/11/20</a:t>
             </a:fld>
             <a:endParaRPr lang="en-US"/>
           </a:p>
@@ -452,7 +566,7 @@
           <a:p>
             <a:fld id="{AE55CC3F-D754-3648-A1F8-EFCD929FF2CD}" type="datetimeFigureOut">
               <a:rPr lang="en-US" smtClean="0"/>
-              <a:t>7/4/20</a:t>
+              <a:t>7/11/20</a:t>
             </a:fld>
             <a:endParaRPr lang="en-US"/>
           </a:p>
@@ -660,7 +774,7 @@
           <a:p>
             <a:fld id="{AE55CC3F-D754-3648-A1F8-EFCD929FF2CD}" type="datetimeFigureOut">
               <a:rPr lang="en-US" smtClean="0"/>
-              <a:t>7/4/20</a:t>
+              <a:t>7/11/20</a:t>
             </a:fld>
             <a:endParaRPr lang="en-US"/>
           </a:p>
@@ -858,7 +972,7 @@
           <a:p>
             <a:fld id="{AE55CC3F-D754-3648-A1F8-EFCD929FF2CD}" type="datetimeFigureOut">
               <a:rPr lang="en-US" smtClean="0"/>
-              <a:t>7/4/20</a:t>
+              <a:t>7/11/20</a:t>
             </a:fld>
             <a:endParaRPr lang="en-US"/>
           </a:p>
@@ -1133,7 +1247,7 @@
           <a:p>
             <a:fld id="{AE55CC3F-D754-3648-A1F8-EFCD929FF2CD}" type="datetimeFigureOut">
               <a:rPr lang="en-US" smtClean="0"/>
-              <a:t>7/4/20</a:t>
+              <a:t>7/11/20</a:t>
             </a:fld>
             <a:endParaRPr lang="en-US"/>
           </a:p>
@@ -1398,7 +1512,7 @@
           <a:p>
             <a:fld id="{AE55CC3F-D754-3648-A1F8-EFCD929FF2CD}" type="datetimeFigureOut">
               <a:rPr lang="en-US" smtClean="0"/>
-              <a:t>7/4/20</a:t>
+              <a:t>7/11/20</a:t>
             </a:fld>
             <a:endParaRPr lang="en-US"/>
           </a:p>
@@ -1810,7 +1924,7 @@
           <a:p>
             <a:fld id="{AE55CC3F-D754-3648-A1F8-EFCD929FF2CD}" type="datetimeFigureOut">
               <a:rPr lang="en-US" smtClean="0"/>
-              <a:t>7/4/20</a:t>
+              <a:t>7/11/20</a:t>
             </a:fld>
             <a:endParaRPr lang="en-US"/>
           </a:p>
@@ -1951,7 +2065,7 @@
           <a:p>
             <a:fld id="{AE55CC3F-D754-3648-A1F8-EFCD929FF2CD}" type="datetimeFigureOut">
               <a:rPr lang="en-US" smtClean="0"/>
-              <a:t>7/4/20</a:t>
+              <a:t>7/11/20</a:t>
             </a:fld>
             <a:endParaRPr lang="en-US"/>
           </a:p>
@@ -2064,7 +2178,7 @@
           <a:p>
             <a:fld id="{AE55CC3F-D754-3648-A1F8-EFCD929FF2CD}" type="datetimeFigureOut">
               <a:rPr lang="en-US" smtClean="0"/>
-              <a:t>7/4/20</a:t>
+              <a:t>7/11/20</a:t>
             </a:fld>
             <a:endParaRPr lang="en-US"/>
           </a:p>
@@ -2375,7 +2489,7 @@
           <a:p>
             <a:fld id="{AE55CC3F-D754-3648-A1F8-EFCD929FF2CD}" type="datetimeFigureOut">
               <a:rPr lang="en-US" smtClean="0"/>
-              <a:t>7/4/20</a:t>
+              <a:t>7/11/20</a:t>
             </a:fld>
             <a:endParaRPr lang="en-US"/>
           </a:p>
@@ -2663,7 +2777,7 @@
           <a:p>
             <a:fld id="{AE55CC3F-D754-3648-A1F8-EFCD929FF2CD}" type="datetimeFigureOut">
               <a:rPr lang="en-US" smtClean="0"/>
-              <a:t>7/4/20</a:t>
+              <a:t>7/11/20</a:t>
             </a:fld>
             <a:endParaRPr lang="en-US"/>
           </a:p>
@@ -2904,7 +3018,7 @@
           <a:p>
             <a:fld id="{AE55CC3F-D754-3648-A1F8-EFCD929FF2CD}" type="datetimeFigureOut">
               <a:rPr lang="en-US" smtClean="0"/>
-              <a:t>7/4/20</a:t>
+              <a:t>7/11/20</a:t>
             </a:fld>
             <a:endParaRPr lang="en-US"/>
           </a:p>
@@ -3881,7 +3995,7 @@
         <p:spPr>
           <a:xfrm>
             <a:off x="2060028" y="1134241"/>
-            <a:ext cx="4810329" cy="2444532"/>
+            <a:ext cx="6248395" cy="2444532"/>
           </a:xfrm>
           <a:prstGeom prst="rect">
             <a:avLst/>
@@ -3970,7 +4084,7 @@
         </p:blipFill>
         <p:spPr>
           <a:xfrm>
-            <a:off x="6556786" y="3016165"/>
+            <a:off x="7960513" y="3040553"/>
             <a:ext cx="627141" cy="627141"/>
           </a:xfrm>
           <a:prstGeom prst="rect">
@@ -4707,41 +4821,6 @@
           </a:p>
         </p:txBody>
       </p:sp>
-      <p:sp>
-        <p:nvSpPr>
-          <p:cNvPr id="87" name="TextBox 86">
-            <a:extLst>
-              <a:ext uri="{FF2B5EF4-FFF2-40B4-BE49-F238E27FC236}">
-                <a16:creationId xmlns:a16="http://schemas.microsoft.com/office/drawing/2014/main" id="{8446BD38-BF58-F54F-BA34-12EC78D5C344}"/>
-              </a:ext>
-            </a:extLst>
-          </p:cNvPr>
-          <p:cNvSpPr txBox="1"/>
-          <p:nvPr/>
-        </p:nvSpPr>
-        <p:spPr>
-          <a:xfrm>
-            <a:off x="6399463" y="4282155"/>
-            <a:ext cx="1589731" cy="369332"/>
-          </a:xfrm>
-          <a:prstGeom prst="rect">
-            <a:avLst/>
-          </a:prstGeom>
-          <a:noFill/>
-        </p:spPr>
-        <p:txBody>
-          <a:bodyPr wrap="none" rtlCol="0">
-            <a:spAutoFit/>
-          </a:bodyPr>
-          <a:lstStyle/>
-          <a:p>
-            <a:r>
-              <a:rPr lang="en-US" dirty="0"/>
-              <a:t>Load Balancers</a:t>
-            </a:r>
-          </a:p>
-        </p:txBody>
-      </p:sp>
       <p:pic>
         <p:nvPicPr>
           <p:cNvPr id="88" name="Picture 87">
@@ -4829,6 +4908,231 @@
             <a:avLst/>
           </a:prstGeom>
           <a:ln>
+            <a:tailEnd type="triangle"/>
+          </a:ln>
+        </p:spPr>
+        <p:style>
+          <a:lnRef idx="1">
+            <a:schemeClr val="accent1"/>
+          </a:lnRef>
+          <a:fillRef idx="0">
+            <a:schemeClr val="accent1"/>
+          </a:fillRef>
+          <a:effectRef idx="0">
+            <a:schemeClr val="accent1"/>
+          </a:effectRef>
+          <a:fontRef idx="minor">
+            <a:schemeClr val="tx1"/>
+          </a:fontRef>
+        </p:style>
+      </p:cxnSp>
+      <p:pic>
+        <p:nvPicPr>
+          <p:cNvPr id="2" name="Picture 1">
+            <a:extLst>
+              <a:ext uri="{FF2B5EF4-FFF2-40B4-BE49-F238E27FC236}">
+                <a16:creationId xmlns:a16="http://schemas.microsoft.com/office/drawing/2014/main" id="{663B3FC0-7A3E-BF4A-9708-907904A539CF}"/>
+              </a:ext>
+            </a:extLst>
+          </p:cNvPr>
+          <p:cNvPicPr>
+            <a:picLocks noChangeAspect="1"/>
+          </p:cNvPicPr>
+          <p:nvPr/>
+        </p:nvPicPr>
+        <p:blipFill>
+          <a:blip r:embed="rId9"/>
+          <a:stretch>
+            <a:fillRect/>
+          </a:stretch>
+        </p:blipFill>
+        <p:spPr>
+          <a:xfrm>
+            <a:off x="6515750" y="2517521"/>
+            <a:ext cx="861664" cy="729451"/>
+          </a:xfrm>
+          <a:prstGeom prst="rect">
+            <a:avLst/>
+          </a:prstGeom>
+        </p:spPr>
+      </p:pic>
+      <p:cxnSp>
+        <p:nvCxnSpPr>
+          <p:cNvPr id="16" name="Straight Arrow Connector 15">
+            <a:extLst>
+              <a:ext uri="{FF2B5EF4-FFF2-40B4-BE49-F238E27FC236}">
+                <a16:creationId xmlns:a16="http://schemas.microsoft.com/office/drawing/2014/main" id="{1EE3FB60-8A67-7D45-B6F0-43CED089F08D}"/>
+              </a:ext>
+            </a:extLst>
+          </p:cNvPr>
+          <p:cNvCxnSpPr>
+            <a:stCxn id="55" idx="3"/>
+            <a:endCxn id="2" idx="0"/>
+          </p:cNvCxnSpPr>
+          <p:nvPr/>
+        </p:nvCxnSpPr>
+        <p:spPr>
+          <a:xfrm>
+            <a:off x="4682354" y="1653983"/>
+            <a:ext cx="2264228" cy="863538"/>
+          </a:xfrm>
+          <a:prstGeom prst="straightConnector1">
+            <a:avLst/>
+          </a:prstGeom>
+          <a:ln>
+            <a:headEnd type="triangle"/>
+            <a:tailEnd type="triangle"/>
+          </a:ln>
+        </p:spPr>
+        <p:style>
+          <a:lnRef idx="1">
+            <a:schemeClr val="accent1"/>
+          </a:lnRef>
+          <a:fillRef idx="0">
+            <a:schemeClr val="accent1"/>
+          </a:fillRef>
+          <a:effectRef idx="0">
+            <a:schemeClr val="accent1"/>
+          </a:effectRef>
+          <a:fontRef idx="minor">
+            <a:schemeClr val="tx1"/>
+          </a:fontRef>
+        </p:style>
+      </p:cxnSp>
+      <p:sp>
+        <p:nvSpPr>
+          <p:cNvPr id="87" name="TextBox 86">
+            <a:extLst>
+              <a:ext uri="{FF2B5EF4-FFF2-40B4-BE49-F238E27FC236}">
+                <a16:creationId xmlns:a16="http://schemas.microsoft.com/office/drawing/2014/main" id="{8446BD38-BF58-F54F-BA34-12EC78D5C344}"/>
+              </a:ext>
+            </a:extLst>
+          </p:cNvPr>
+          <p:cNvSpPr txBox="1"/>
+          <p:nvPr/>
+        </p:nvSpPr>
+        <p:spPr>
+          <a:xfrm>
+            <a:off x="7634282" y="4328100"/>
+            <a:ext cx="1409377" cy="646331"/>
+          </a:xfrm>
+          <a:prstGeom prst="rect">
+            <a:avLst/>
+          </a:prstGeom>
+          <a:noFill/>
+        </p:spPr>
+        <p:txBody>
+          <a:bodyPr wrap="square" rtlCol="0">
+            <a:spAutoFit/>
+          </a:bodyPr>
+          <a:lstStyle/>
+          <a:p>
+            <a:r>
+              <a:rPr lang="en-US" dirty="0"/>
+              <a:t>Load Balancers</a:t>
+            </a:r>
+          </a:p>
+        </p:txBody>
+      </p:sp>
+      <p:pic>
+        <p:nvPicPr>
+          <p:cNvPr id="47" name="Picture 46">
+            <a:extLst>
+              <a:ext uri="{FF2B5EF4-FFF2-40B4-BE49-F238E27FC236}">
+                <a16:creationId xmlns:a16="http://schemas.microsoft.com/office/drawing/2014/main" id="{1336D0F7-3708-0C44-995F-0E1777AF5FD2}"/>
+              </a:ext>
+            </a:extLst>
+          </p:cNvPr>
+          <p:cNvPicPr>
+            <a:picLocks noChangeAspect="1"/>
+          </p:cNvPicPr>
+          <p:nvPr/>
+        </p:nvPicPr>
+        <p:blipFill>
+          <a:blip r:embed="rId7"/>
+          <a:stretch>
+            <a:fillRect/>
+          </a:stretch>
+        </p:blipFill>
+        <p:spPr>
+          <a:xfrm>
+            <a:off x="6448420" y="3996120"/>
+            <a:ext cx="812800" cy="812800"/>
+          </a:xfrm>
+          <a:prstGeom prst="rect">
+            <a:avLst/>
+          </a:prstGeom>
+        </p:spPr>
+      </p:pic>
+      <p:cxnSp>
+        <p:nvCxnSpPr>
+          <p:cNvPr id="48" name="Straight Arrow Connector 47">
+            <a:extLst>
+              <a:ext uri="{FF2B5EF4-FFF2-40B4-BE49-F238E27FC236}">
+                <a16:creationId xmlns:a16="http://schemas.microsoft.com/office/drawing/2014/main" id="{F1F40F82-2CA5-674D-89E9-233BEE209896}"/>
+              </a:ext>
+            </a:extLst>
+          </p:cNvPr>
+          <p:cNvCxnSpPr>
+            <a:cxnSpLocks/>
+            <a:stCxn id="47" idx="2"/>
+          </p:cNvCxnSpPr>
+          <p:nvPr/>
+        </p:nvCxnSpPr>
+        <p:spPr>
+          <a:xfrm flipH="1">
+            <a:off x="6853248" y="4808920"/>
+            <a:ext cx="1572" cy="416187"/>
+          </a:xfrm>
+          <a:prstGeom prst="straightConnector1">
+            <a:avLst/>
+          </a:prstGeom>
+          <a:ln>
+            <a:headEnd type="triangle"/>
+            <a:tailEnd type="triangle"/>
+          </a:ln>
+        </p:spPr>
+        <p:style>
+          <a:lnRef idx="1">
+            <a:schemeClr val="accent1"/>
+          </a:lnRef>
+          <a:fillRef idx="0">
+            <a:schemeClr val="accent1"/>
+          </a:fillRef>
+          <a:effectRef idx="0">
+            <a:schemeClr val="accent1"/>
+          </a:effectRef>
+          <a:fontRef idx="minor">
+            <a:schemeClr val="tx1"/>
+          </a:fontRef>
+        </p:style>
+      </p:cxnSp>
+      <p:cxnSp>
+        <p:nvCxnSpPr>
+          <p:cNvPr id="52" name="Straight Arrow Connector 51">
+            <a:extLst>
+              <a:ext uri="{FF2B5EF4-FFF2-40B4-BE49-F238E27FC236}">
+                <a16:creationId xmlns:a16="http://schemas.microsoft.com/office/drawing/2014/main" id="{289D9AE1-D10C-5443-8433-3D6DAC3257B1}"/>
+              </a:ext>
+            </a:extLst>
+          </p:cNvPr>
+          <p:cNvCxnSpPr>
+            <a:cxnSpLocks/>
+            <a:stCxn id="2" idx="2"/>
+            <a:endCxn id="47" idx="0"/>
+          </p:cNvCxnSpPr>
+          <p:nvPr/>
+        </p:nvCxnSpPr>
+        <p:spPr>
+          <a:xfrm flipH="1">
+            <a:off x="6854820" y="3246972"/>
+            <a:ext cx="91762" cy="749148"/>
+          </a:xfrm>
+          <a:prstGeom prst="straightConnector1">
+            <a:avLst/>
+          </a:prstGeom>
+          <a:ln>
+            <a:headEnd type="triangle"/>
             <a:tailEnd type="triangle"/>
           </a:ln>
         </p:spPr>

</xml_diff>